<commit_message>
updated family diagram - delta_gamma - delta_lognormal - bernoulli
</commit_message>
<xml_diff>
--- a/dfo-tesa-2023/images/family_diagram.pptx
+++ b/dfo-tesa-2023/images/family_diagram.pptx
@@ -104,6 +104,11 @@
       </a:defRPr>
     </a:lvl9pPr>
   </p:defaultTextStyle>
+  <p:extLst>
+    <p:ext uri="{EFAFB233-063F-42B5-8137-9DF3F51BA10A}">
+      <p15:sldGuideLst xmlns:p15="http://schemas.microsoft.com/office/powerpoint/2012/main"/>
+    </p:ext>
+  </p:extLst>
 </p:presentation>
 </file>
 
@@ -254,7 +259,7 @@
           <a:p>
             <a:fld id="{50AB081F-1665-4144-98BC-F10A389EDFBD}" type="datetimeFigureOut">
               <a:rPr lang="en-US" smtClean="0"/>
-              <a:t>1/10/23</a:t>
+              <a:t>1/18/23</a:t>
             </a:fld>
             <a:endParaRPr lang="en-US"/>
           </a:p>
@@ -452,7 +457,7 @@
           <a:p>
             <a:fld id="{50AB081F-1665-4144-98BC-F10A389EDFBD}" type="datetimeFigureOut">
               <a:rPr lang="en-US" smtClean="0"/>
-              <a:t>1/10/23</a:t>
+              <a:t>1/18/23</a:t>
             </a:fld>
             <a:endParaRPr lang="en-US"/>
           </a:p>
@@ -660,7 +665,7 @@
           <a:p>
             <a:fld id="{50AB081F-1665-4144-98BC-F10A389EDFBD}" type="datetimeFigureOut">
               <a:rPr lang="en-US" smtClean="0"/>
-              <a:t>1/10/23</a:t>
+              <a:t>1/18/23</a:t>
             </a:fld>
             <a:endParaRPr lang="en-US"/>
           </a:p>
@@ -858,7 +863,7 @@
           <a:p>
             <a:fld id="{50AB081F-1665-4144-98BC-F10A389EDFBD}" type="datetimeFigureOut">
               <a:rPr lang="en-US" smtClean="0"/>
-              <a:t>1/10/23</a:t>
+              <a:t>1/18/23</a:t>
             </a:fld>
             <a:endParaRPr lang="en-US"/>
           </a:p>
@@ -1133,7 +1138,7 @@
           <a:p>
             <a:fld id="{50AB081F-1665-4144-98BC-F10A389EDFBD}" type="datetimeFigureOut">
               <a:rPr lang="en-US" smtClean="0"/>
-              <a:t>1/10/23</a:t>
+              <a:t>1/18/23</a:t>
             </a:fld>
             <a:endParaRPr lang="en-US"/>
           </a:p>
@@ -1398,7 +1403,7 @@
           <a:p>
             <a:fld id="{50AB081F-1665-4144-98BC-F10A389EDFBD}" type="datetimeFigureOut">
               <a:rPr lang="en-US" smtClean="0"/>
-              <a:t>1/10/23</a:t>
+              <a:t>1/18/23</a:t>
             </a:fld>
             <a:endParaRPr lang="en-US"/>
           </a:p>
@@ -1810,7 +1815,7 @@
           <a:p>
             <a:fld id="{50AB081F-1665-4144-98BC-F10A389EDFBD}" type="datetimeFigureOut">
               <a:rPr lang="en-US" smtClean="0"/>
-              <a:t>1/10/23</a:t>
+              <a:t>1/18/23</a:t>
             </a:fld>
             <a:endParaRPr lang="en-US"/>
           </a:p>
@@ -1951,7 +1956,7 @@
           <a:p>
             <a:fld id="{50AB081F-1665-4144-98BC-F10A389EDFBD}" type="datetimeFigureOut">
               <a:rPr lang="en-US" smtClean="0"/>
-              <a:t>1/10/23</a:t>
+              <a:t>1/18/23</a:t>
             </a:fld>
             <a:endParaRPr lang="en-US"/>
           </a:p>
@@ -2064,7 +2069,7 @@
           <a:p>
             <a:fld id="{50AB081F-1665-4144-98BC-F10A389EDFBD}" type="datetimeFigureOut">
               <a:rPr lang="en-US" smtClean="0"/>
-              <a:t>1/10/23</a:t>
+              <a:t>1/18/23</a:t>
             </a:fld>
             <a:endParaRPr lang="en-US"/>
           </a:p>
@@ -2375,7 +2380,7 @@
           <a:p>
             <a:fld id="{50AB081F-1665-4144-98BC-F10A389EDFBD}" type="datetimeFigureOut">
               <a:rPr lang="en-US" smtClean="0"/>
-              <a:t>1/10/23</a:t>
+              <a:t>1/18/23</a:t>
             </a:fld>
             <a:endParaRPr lang="en-US"/>
           </a:p>
@@ -2663,7 +2668,7 @@
           <a:p>
             <a:fld id="{50AB081F-1665-4144-98BC-F10A389EDFBD}" type="datetimeFigureOut">
               <a:rPr lang="en-US" smtClean="0"/>
-              <a:t>1/10/23</a:t>
+              <a:t>1/18/23</a:t>
             </a:fld>
             <a:endParaRPr lang="en-US"/>
           </a:p>
@@ -2904,7 +2909,7 @@
           <a:p>
             <a:fld id="{50AB081F-1665-4144-98BC-F10A389EDFBD}" type="datetimeFigureOut">
               <a:rPr lang="en-US" smtClean="0"/>
-              <a:t>1/10/23</a:t>
+              <a:t>1/18/23</a:t>
             </a:fld>
             <a:endParaRPr lang="en-US"/>
           </a:p>
@@ -3336,7 +3341,7 @@
         <p:spPr>
           <a:xfrm>
             <a:off x="885620" y="2779896"/>
-            <a:ext cx="729687" cy="461665"/>
+            <a:ext cx="742511" cy="646331"/>
           </a:xfrm>
           <a:prstGeom prst="rect">
             <a:avLst/>
@@ -3350,6 +3355,13 @@
             <a:spAutoFit/>
           </a:bodyPr>
           <a:lstStyle/>
+          <a:p>
+            <a:r>
+              <a:rPr lang="en-US" sz="1200" dirty="0" err="1"/>
+              <a:t>bernoulli</a:t>
+            </a:r>
+            <a:endParaRPr lang="en-US" sz="1200" dirty="0"/>
+          </a:p>
           <a:p>
             <a:r>
               <a:rPr lang="en-US" sz="1200" dirty="0"/>
@@ -3682,7 +3694,7 @@
         <p:spPr>
           <a:xfrm>
             <a:off x="353593" y="2393112"/>
-            <a:ext cx="0" cy="945670"/>
+            <a:ext cx="0" cy="1076009"/>
           </a:xfrm>
           <a:prstGeom prst="straightConnector1">
             <a:avLst/>
@@ -3847,7 +3859,7 @@
         </p:nvSpPr>
         <p:spPr>
           <a:xfrm>
-            <a:off x="39506" y="3367249"/>
+            <a:off x="25710" y="3519219"/>
             <a:ext cx="1315938" cy="276999"/>
           </a:xfrm>
           <a:prstGeom prst="rect">
@@ -6083,7 +6095,7 @@
         <p:spPr>
           <a:xfrm>
             <a:off x="7210303" y="3472294"/>
-            <a:ext cx="2069541" cy="461665"/>
+            <a:ext cx="2069541" cy="830997"/>
           </a:xfrm>
           <a:prstGeom prst="rect">
             <a:avLst/>
@@ -6097,6 +6109,20 @@
             <a:spAutoFit/>
           </a:bodyPr>
           <a:lstStyle/>
+          <a:p>
+            <a:r>
+              <a:rPr lang="en-US" sz="1200" dirty="0" err="1"/>
+              <a:t>delta_gamma</a:t>
+            </a:r>
+            <a:endParaRPr lang="en-US" sz="1200" dirty="0"/>
+          </a:p>
+          <a:p>
+            <a:r>
+              <a:rPr lang="en-US" sz="1200" dirty="0" err="1"/>
+              <a:t>delta_lognormal</a:t>
+            </a:r>
+            <a:endParaRPr lang="en-US" sz="1200" dirty="0"/>
+          </a:p>
           <a:p>
             <a:r>
               <a:rPr lang="en-US" sz="1200" dirty="0" err="1"/>

</xml_diff>